<commit_message>
Add repo QR-Code to slides and documentation
</commit_message>
<xml_diff>
--- a/slides/MSD_Exam.pptx
+++ b/slides/MSD_Exam.pptx
@@ -191,10 +191,9 @@
 <p1510:revInfo xmlns:a="http://schemas.openxmlformats.org/drawingml/2006/main" xmlns:r="http://schemas.openxmlformats.org/officeDocument/2006/relationships" xmlns:p1510="http://schemas.microsoft.com/office/powerpoint/2015/10/main">
   <p1510:revLst>
     <p1510:client id="{2557042B-A59D-BD0E-9379-1934744A1E40}" v="3798" dt="2024-07-10T10:56:40.357"/>
+    <p1510:client id="{4B981043-0835-787A-6EF1-1EA9CA3CCEC3}" v="22" dt="2024-07-10T17:46:04.241"/>
     <p1510:client id="{5ECBC5B7-E559-C12F-DEB8-B15367E5465E}" v="75" dt="2024-07-10T11:00:38.649"/>
     <p1510:client id="{7B6FC6C0-AB28-8D3C-8C03-C5214151DBCF}" v="17" dt="2024-07-08T20:11:58.869"/>
-    <p1510:client id="{BA49A966-32AF-6B93-62BF-8BF2DD47F69B}" v="294" dt="2024-07-08T11:48:51.813"/>
-    <p1510:client id="{CD9112B0-6032-47B4-B0B0-86CABD6C3603}" v="570" dt="2024-07-08T12:21:30.061"/>
   </p1510:revLst>
 </p1510:revInfo>
 </file>
@@ -5278,6 +5277,45 @@
           </a:p>
         </p:txBody>
       </p:sp>
+      <p:pic>
+        <p:nvPicPr>
+          <p:cNvPr id="3" name="Grafik 2" descr="Ein Bild, das Muster, weiß enthält.&#10;&#10;Beschreibung automatisch generiert.">
+            <a:extLst>
+              <a:ext uri="{FF2B5EF4-FFF2-40B4-BE49-F238E27FC236}">
+                <a16:creationId xmlns:a16="http://schemas.microsoft.com/office/drawing/2014/main" id="{FEAC77FB-79A0-6B56-2452-34C302BAB283}"/>
+              </a:ext>
+            </a:extLst>
+          </p:cNvPr>
+          <p:cNvPicPr>
+            <a:picLocks noChangeAspect="1"/>
+          </p:cNvPicPr>
+          <p:nvPr/>
+        </p:nvPicPr>
+        <p:blipFill rotWithShape="1">
+          <a:blip r:embed="rId2"/>
+          <a:srcRect l="8730" t="9016" r="7821" b="9714"/>
+          <a:stretch/>
+        </p:blipFill>
+        <p:spPr>
+          <a:xfrm>
+            <a:off x="7651277" y="1527182"/>
+            <a:ext cx="1345320" cy="1310190"/>
+          </a:xfrm>
+          <a:prstGeom prst="rect">
+            <a:avLst/>
+          </a:prstGeom>
+          <a:ln>
+            <a:noFill/>
+          </a:ln>
+          <a:effectLst>
+            <a:outerShdw blurRad="190500" algn="tl" rotWithShape="0">
+              <a:srgbClr val="000000">
+                <a:alpha val="70000"/>
+              </a:srgbClr>
+            </a:outerShdw>
+          </a:effectLst>
+        </p:spPr>
+      </p:pic>
     </p:spTree>
     <p:extLst>
       <p:ext uri="{BB962C8B-B14F-4D97-AF65-F5344CB8AC3E}">

</xml_diff>